<commit_message>
complete SBOL Visual 1.1 rough draft with TODOs
</commit_message>
<xml_diff>
--- a/specification/imgsrc/sbolv_general.pptx
+++ b/specification/imgsrc/sbolv_general.pptx
@@ -305,7 +305,7 @@
           <a:p>
             <a:fld id="{B519623D-D8C4-D246-A1F7-180DFBDF806B}" type="datetimeFigureOut">
               <a:rPr lang="en-US" smtClean="0"/>
-              <a:t>10/8/17</a:t>
+              <a:t>10/9/17</a:t>
             </a:fld>
             <a:endParaRPr lang="en-US"/>
           </a:p>
@@ -475,7 +475,7 @@
           <a:p>
             <a:fld id="{B519623D-D8C4-D246-A1F7-180DFBDF806B}" type="datetimeFigureOut">
               <a:rPr lang="en-US" smtClean="0"/>
-              <a:t>10/8/17</a:t>
+              <a:t>10/9/17</a:t>
             </a:fld>
             <a:endParaRPr lang="en-US"/>
           </a:p>
@@ -655,7 +655,7 @@
           <a:p>
             <a:fld id="{B519623D-D8C4-D246-A1F7-180DFBDF806B}" type="datetimeFigureOut">
               <a:rPr lang="en-US" smtClean="0"/>
-              <a:t>10/8/17</a:t>
+              <a:t>10/9/17</a:t>
             </a:fld>
             <a:endParaRPr lang="en-US"/>
           </a:p>
@@ -825,7 +825,7 @@
           <a:p>
             <a:fld id="{B519623D-D8C4-D246-A1F7-180DFBDF806B}" type="datetimeFigureOut">
               <a:rPr lang="en-US" smtClean="0"/>
-              <a:t>10/8/17</a:t>
+              <a:t>10/9/17</a:t>
             </a:fld>
             <a:endParaRPr lang="en-US"/>
           </a:p>
@@ -1071,7 +1071,7 @@
           <a:p>
             <a:fld id="{B519623D-D8C4-D246-A1F7-180DFBDF806B}" type="datetimeFigureOut">
               <a:rPr lang="en-US" smtClean="0"/>
-              <a:t>10/8/17</a:t>
+              <a:t>10/9/17</a:t>
             </a:fld>
             <a:endParaRPr lang="en-US"/>
           </a:p>
@@ -1359,7 +1359,7 @@
           <a:p>
             <a:fld id="{B519623D-D8C4-D246-A1F7-180DFBDF806B}" type="datetimeFigureOut">
               <a:rPr lang="en-US" smtClean="0"/>
-              <a:t>10/8/17</a:t>
+              <a:t>10/9/17</a:t>
             </a:fld>
             <a:endParaRPr lang="en-US"/>
           </a:p>
@@ -1781,7 +1781,7 @@
           <a:p>
             <a:fld id="{B519623D-D8C4-D246-A1F7-180DFBDF806B}" type="datetimeFigureOut">
               <a:rPr lang="en-US" smtClean="0"/>
-              <a:t>10/8/17</a:t>
+              <a:t>10/9/17</a:t>
             </a:fld>
             <a:endParaRPr lang="en-US"/>
           </a:p>
@@ -1899,7 +1899,7 @@
           <a:p>
             <a:fld id="{B519623D-D8C4-D246-A1F7-180DFBDF806B}" type="datetimeFigureOut">
               <a:rPr lang="en-US" smtClean="0"/>
-              <a:t>10/8/17</a:t>
+              <a:t>10/9/17</a:t>
             </a:fld>
             <a:endParaRPr lang="en-US"/>
           </a:p>
@@ -1994,7 +1994,7 @@
           <a:p>
             <a:fld id="{B519623D-D8C4-D246-A1F7-180DFBDF806B}" type="datetimeFigureOut">
               <a:rPr lang="en-US" smtClean="0"/>
-              <a:t>10/8/17</a:t>
+              <a:t>10/9/17</a:t>
             </a:fld>
             <a:endParaRPr lang="en-US"/>
           </a:p>
@@ -2271,7 +2271,7 @@
           <a:p>
             <a:fld id="{B519623D-D8C4-D246-A1F7-180DFBDF806B}" type="datetimeFigureOut">
               <a:rPr lang="en-US" smtClean="0"/>
-              <a:t>10/8/17</a:t>
+              <a:t>10/9/17</a:t>
             </a:fld>
             <a:endParaRPr lang="en-US"/>
           </a:p>
@@ -2524,7 +2524,7 @@
           <a:p>
             <a:fld id="{B519623D-D8C4-D246-A1F7-180DFBDF806B}" type="datetimeFigureOut">
               <a:rPr lang="en-US" smtClean="0"/>
-              <a:t>10/8/17</a:t>
+              <a:t>10/9/17</a:t>
             </a:fld>
             <a:endParaRPr lang="en-US"/>
           </a:p>
@@ -2737,7 +2737,7 @@
           <a:p>
             <a:fld id="{B519623D-D8C4-D246-A1F7-180DFBDF806B}" type="datetimeFigureOut">
               <a:rPr lang="en-US" smtClean="0"/>
-              <a:t>10/8/17</a:t>
+              <a:t>10/9/17</a:t>
             </a:fld>
             <a:endParaRPr lang="en-US"/>
           </a:p>
@@ -4688,6 +4688,64 @@
                 </a:solidFill>
               </a:rPr>
               <a:t>ComponentDefinition</a:t>
+            </a:r>
+            <a:endParaRPr lang="en-US" i="1" dirty="0">
+              <a:solidFill>
+                <a:schemeClr val="tx2"/>
+              </a:solidFill>
+            </a:endParaRPr>
+          </a:p>
+        </p:txBody>
+      </p:sp>
+      <p:sp>
+        <p:nvSpPr>
+          <p:cNvPr id="7" name="Cloud 6"/>
+          <p:cNvSpPr/>
+          <p:nvPr/>
+        </p:nvSpPr>
+        <p:spPr>
+          <a:xfrm>
+            <a:off x="7333884" y="1932994"/>
+            <a:ext cx="1647827" cy="774477"/>
+          </a:xfrm>
+          <a:prstGeom prst="cloud">
+            <a:avLst/>
+          </a:prstGeom>
+          <a:noFill/>
+          <a:ln w="19050" cmpd="sng">
+            <a:solidFill>
+              <a:schemeClr val="tx2"/>
+            </a:solidFill>
+            <a:prstDash val="sysDash"/>
+          </a:ln>
+          <a:effectLst/>
+        </p:spPr>
+        <p:style>
+          <a:lnRef idx="1">
+            <a:schemeClr val="accent1"/>
+          </a:lnRef>
+          <a:fillRef idx="3">
+            <a:schemeClr val="accent1"/>
+          </a:fillRef>
+          <a:effectRef idx="2">
+            <a:schemeClr val="accent1"/>
+          </a:effectRef>
+          <a:fontRef idx="minor">
+            <a:schemeClr val="lt1"/>
+          </a:fontRef>
+        </p:style>
+        <p:txBody>
+          <a:bodyPr wrap="none" rtlCol="0" anchor="ctr"/>
+          <a:lstStyle/>
+          <a:p>
+            <a:pPr algn="ctr"/>
+            <a:r>
+              <a:rPr lang="en-US" i="1" dirty="0" smtClean="0">
+                <a:solidFill>
+                  <a:schemeClr val="tx2"/>
+                </a:solidFill>
+              </a:rPr>
+              <a:t>Annotation</a:t>
             </a:r>
             <a:endParaRPr lang="en-US" i="1" dirty="0">
               <a:solidFill>

</xml_diff>